<commit_message>
lab3 - TDD Bowling game example
</commit_message>
<xml_diff>
--- a/lab2/Aclabs_2.pptx
+++ b/lab2/Aclabs_2.pptx
@@ -25970,7 +25970,7 @@
           </a:p>
           <a:p>
             <a:r>
-              <a:rPr lang="en-US" sz="1200" b="0" i="0" kern="1200">
+              <a:rPr lang="en-US" sz="1200" b="0" i="0" kern="1200" dirty="0">
                 <a:solidFill>
                   <a:schemeClr val="tx1"/>
                 </a:solidFill>
@@ -26857,11 +26857,7 @@
           <a:p>
             <a:r>
               <a:rPr lang="en-US" dirty="0"/>
-              <a:t>The truth is, the work that you do to break dependencies and write tests for your changes is going to take some time, but in most cases, you are going to end up saving time—and a lot of frustration. When? Well, it depends on the project. In some cases, you might write tests for some code that you need to change, and it takes you two hours to do that. The change that you make afterward might take 15 minutes. When you look back on the experience, you might say, “I just wasted two hours—was it worth it?” It depends. You don’t know how long that work might have taken you if you hadn’t written the tests. You also don’t know how much time it would’ve taken you to debug if you made a mistake, time you could have saved if you had tests in place. I’m not only talking about the amount of time you would save if the tests caught the error, but also the amount of time tests save you when you are trying to find an error. </a:t>
-            </a:r>
-            <a:r>
-              <a:rPr lang="en-US"/>
-              <a:t>With tests around the code, nailing down functional problems is often easier.</a:t>
+              <a:t>The truth is, the work that you do to break dependencies and write tests for your changes is going to take some time, but in most cases, you are going to end up saving time—and a lot of frustration. When? Well, it depends on the project. In some cases, you might write tests for some code that you need to change, and it takes you two hours to do that. The change that you make afterward might take 15 minutes. When you look back on the experience, you might say, “I just wasted two hours—was it worth it?” It depends. You don’t know how long that work might have taken you if you hadn’t written the tests. You also don’t know how much time it would’ve taken you to debug if you made a mistake, time you could have saved if you had tests in place. I’m not only talking about the amount of time you would save if the tests caught the error, but also the amount of time tests save you when you are trying to find an error. With tests around the code, nailing down functional problems is often easier.</a:t>
             </a:r>
           </a:p>
         </p:txBody>
@@ -27164,7 +27160,31 @@
                 <a:ea typeface="+mn-ea"/>
                 <a:cs typeface="+mn-cs"/>
               </a:rPr>
-              <a:t>Is this fixing a bug or adding a new feature?</a:t>
+              <a:t>Is this </a:t>
+            </a:r>
+            <a:r>
+              <a:rPr lang="en-US" sz="1200" b="1" i="0" kern="1200" dirty="0">
+                <a:solidFill>
+                  <a:schemeClr val="tx1"/>
+                </a:solidFill>
+                <a:effectLst/>
+                <a:latin typeface="+mn-lt"/>
+                <a:ea typeface="+mn-ea"/>
+                <a:cs typeface="+mn-cs"/>
+              </a:rPr>
+              <a:t>fixing a bug or adding a new feature</a:t>
+            </a:r>
+            <a:r>
+              <a:rPr lang="en-US" sz="1200" b="0" i="0" kern="1200" dirty="0">
+                <a:solidFill>
+                  <a:schemeClr val="tx1"/>
+                </a:solidFill>
+                <a:effectLst/>
+                <a:latin typeface="+mn-lt"/>
+                <a:ea typeface="+mn-ea"/>
+                <a:cs typeface="+mn-cs"/>
+              </a:rPr>
+              <a:t>?</a:t>
             </a:r>
           </a:p>
           <a:p>
@@ -27257,10 +27277,34 @@
                 <a:ea typeface="+mn-ea"/>
                 <a:cs typeface="+mn-cs"/>
               </a:rPr>
-              <a:t>The act of improving design without changing its behavior is called </a:t>
+              <a:t>The act of </a:t>
             </a:r>
             <a:r>
-              <a:rPr lang="en-US" sz="1200" b="0" i="1" kern="1200" dirty="0">
+              <a:rPr lang="en-US" sz="1200" b="1" i="0" kern="1200" dirty="0">
+                <a:solidFill>
+                  <a:schemeClr val="tx1"/>
+                </a:solidFill>
+                <a:effectLst/>
+                <a:latin typeface="+mn-lt"/>
+                <a:ea typeface="+mn-ea"/>
+                <a:cs typeface="+mn-cs"/>
+              </a:rPr>
+              <a:t>improving design without changing its behavior is called</a:t>
+            </a:r>
+            <a:r>
+              <a:rPr lang="en-US" sz="1200" b="0" i="0" kern="1200" dirty="0">
+                <a:solidFill>
+                  <a:schemeClr val="tx1"/>
+                </a:solidFill>
+                <a:effectLst/>
+                <a:latin typeface="+mn-lt"/>
+                <a:ea typeface="+mn-ea"/>
+                <a:cs typeface="+mn-cs"/>
+              </a:rPr>
+              <a:t> </a:t>
+            </a:r>
+            <a:r>
+              <a:rPr lang="en-US" sz="1200" b="1" i="1" kern="1200" dirty="0">
                 <a:solidFill>
                   <a:schemeClr val="tx1"/>
                 </a:solidFill>
@@ -27477,7 +27521,31 @@
                 <a:ea typeface="+mn-ea"/>
                 <a:cs typeface="+mn-cs"/>
               </a:rPr>
-              <a:t>Avoiding change has other bad consequences. When people don’t make changes often they get rusty at it. Breaking down a big class into pieces can be pretty involved work unless you do it a couple of times a week. When you do, it becomes routine. You get better at figuring out what can break and what can’t, and it is much easier to do.</a:t>
+              <a:t>Avoiding change has other bad consequences. </a:t>
+            </a:r>
+            <a:r>
+              <a:rPr lang="en-US" sz="1200" b="1" i="0" kern="1200" dirty="0">
+                <a:solidFill>
+                  <a:schemeClr val="tx1"/>
+                </a:solidFill>
+                <a:effectLst/>
+                <a:latin typeface="+mn-lt"/>
+                <a:ea typeface="+mn-ea"/>
+                <a:cs typeface="+mn-cs"/>
+              </a:rPr>
+              <a:t>When people don’t make changes often they get rusty at it</a:t>
+            </a:r>
+            <a:r>
+              <a:rPr lang="en-US" sz="1200" b="0" i="0" kern="1200" dirty="0">
+                <a:solidFill>
+                  <a:schemeClr val="tx1"/>
+                </a:solidFill>
+                <a:effectLst/>
+                <a:latin typeface="+mn-lt"/>
+                <a:ea typeface="+mn-ea"/>
+                <a:cs typeface="+mn-cs"/>
+              </a:rPr>
+              <a:t>. Breaking down a big class into pieces can be pretty involved work unless you do it a couple of times a week. When you do, it becomes routine. You get better at figuring out what can break and what can’t, and it is much easier to do.</a:t>
             </a:r>
           </a:p>
           <a:p>
@@ -27508,7 +27576,31 @@
                 <a:ea typeface="+mn-ea"/>
                 <a:cs typeface="+mn-cs"/>
               </a:rPr>
-              <a:t>The last consequence of avoiding change is fear. Unfortunately, many teams live with incredible fear of change and it gets worse every day. Often they aren’t aware of how much fear they have until they learn better techniques and the fear starts to fade away.</a:t>
+              <a:t>The last consequence of avoiding change is </a:t>
+            </a:r>
+            <a:r>
+              <a:rPr lang="en-US" sz="1200" b="1" i="0" kern="1200" dirty="0">
+                <a:solidFill>
+                  <a:schemeClr val="tx1"/>
+                </a:solidFill>
+                <a:effectLst/>
+                <a:latin typeface="+mn-lt"/>
+                <a:ea typeface="+mn-ea"/>
+                <a:cs typeface="+mn-cs"/>
+              </a:rPr>
+              <a:t>fear</a:t>
+            </a:r>
+            <a:r>
+              <a:rPr lang="en-US" sz="1200" b="0" i="0" kern="1200" dirty="0">
+                <a:solidFill>
+                  <a:schemeClr val="tx1"/>
+                </a:solidFill>
+                <a:effectLst/>
+                <a:latin typeface="+mn-lt"/>
+                <a:ea typeface="+mn-ea"/>
+                <a:cs typeface="+mn-cs"/>
+              </a:rPr>
+              <a:t>. Unfortunately, many teams live with incredible fear of change and it gets worse every day. Often they aren’t aware of how much fear they have until they learn better techniques and the fear starts to fade away.</a:t>
             </a:r>
             <a:endParaRPr lang="en-US" dirty="0"/>
           </a:p>
@@ -27610,7 +27702,7 @@
               <a:t>Unfortunately, </a:t>
             </a:r>
             <a:r>
-              <a:rPr lang="en-US" sz="1200" b="0" i="1" kern="1200" dirty="0">
+              <a:rPr lang="en-US" sz="1200" b="1" i="1" kern="1200" dirty="0">
                 <a:solidFill>
                   <a:schemeClr val="tx1"/>
                 </a:solidFill>
@@ -27698,6 +27790,18 @@
           </a:p>
           <a:p>
             <a:r>
+              <a:rPr lang="en-US" sz="1200" b="1" i="0" kern="1200" dirty="0">
+                <a:solidFill>
+                  <a:schemeClr val="tx1"/>
+                </a:solidFill>
+                <a:effectLst/>
+                <a:latin typeface="+mn-lt"/>
+                <a:ea typeface="+mn-ea"/>
+                <a:cs typeface="+mn-cs"/>
+              </a:rPr>
+              <a:t>But safety isn’t solely a function of care. </a:t>
+            </a:r>
+            <a:r>
               <a:rPr lang="en-US" sz="1200" b="0" i="0" kern="1200" dirty="0">
                 <a:solidFill>
                   <a:schemeClr val="tx1"/>
@@ -27707,12 +27811,36 @@
                 <a:ea typeface="+mn-ea"/>
                 <a:cs typeface="+mn-cs"/>
               </a:rPr>
-              <a:t>But safety isn’t solely a function of care. Effective software change, like effective surgery, really involves deeper skills. Working with care doesn’t do much for you if you don’t use the right tools and techniques.</a:t>
+              <a:t>Effective software change, like effective surgery, </a:t>
+            </a:r>
+            <a:r>
+              <a:rPr lang="en-US" sz="1200" b="1" i="0" kern="1200" dirty="0">
+                <a:solidFill>
+                  <a:schemeClr val="tx1"/>
+                </a:solidFill>
+                <a:effectLst/>
+                <a:latin typeface="+mn-lt"/>
+                <a:ea typeface="+mn-ea"/>
+                <a:cs typeface="+mn-cs"/>
+              </a:rPr>
+              <a:t>really involves deeper skills. </a:t>
+            </a:r>
+            <a:r>
+              <a:rPr lang="en-US" sz="1200" b="0" i="0" kern="1200" dirty="0">
+                <a:solidFill>
+                  <a:schemeClr val="tx1"/>
+                </a:solidFill>
+                <a:effectLst/>
+                <a:latin typeface="+mn-lt"/>
+                <a:ea typeface="+mn-ea"/>
+                <a:cs typeface="+mn-cs"/>
+              </a:rPr>
+              <a:t>Working with care doesn’t do much for you if you don’t use the right tools and techniques.</a:t>
             </a:r>
           </a:p>
           <a:p>
             <a:r>
-              <a:rPr lang="en-US" sz="1200" b="0" i="1" kern="1200" dirty="0">
+              <a:rPr lang="en-US" sz="1200" b="1" i="1" kern="1200" dirty="0">
                 <a:solidFill>
                   <a:schemeClr val="tx1"/>
                 </a:solidFill>
@@ -28111,20 +28239,6 @@
             <a:r>
               <a:rPr lang="en-US" dirty="0"/>
               <a:t>The Legacy Code Dilemma - When we change code, we should have tests in place. To put tests in place, we often have to change code.</a:t>
-            </a:r>
-          </a:p>
-          <a:p>
-            <a:r>
-              <a:rPr lang="en-US" sz="1200" b="0" i="0" kern="1200" dirty="0">
-                <a:solidFill>
-                  <a:schemeClr val="tx1"/>
-                </a:solidFill>
-                <a:effectLst/>
-                <a:latin typeface="+mn-lt"/>
-                <a:ea typeface="+mn-ea"/>
-                <a:cs typeface="+mn-cs"/>
-              </a:rPr>
-              <a:t>When we b</a:t>
             </a:r>
           </a:p>
           <a:p>
@@ -33761,13 +33875,13 @@
           <a:lstStyle/>
           <a:p>
             <a:r>
-              <a:rPr lang="en-US" b="1"/>
+              <a:rPr lang="en-US" b="1" dirty="0"/>
               <a:t>Dependency-Breaking Techniques</a:t>
             </a:r>
             <a:br>
-              <a:rPr lang="en-US" b="1"/>
+              <a:rPr lang="en-US" b="1" dirty="0"/>
             </a:br>
-            <a:endParaRPr lang="en-US"/>
+            <a:endParaRPr lang="en-US" dirty="0"/>
           </a:p>
         </p:txBody>
       </p:sp>
@@ -34386,7 +34500,7 @@
           <a:lstStyle/>
           <a:p>
             <a:r>
-              <a:rPr lang="en-US" sz="4100">
+              <a:rPr lang="en-US" sz="4100" dirty="0">
                 <a:solidFill>
                   <a:srgbClr val="FFFFFF"/>
                 </a:solidFill>
@@ -38208,14 +38322,14 @@
           <a:lstStyle/>
           <a:p>
             <a:r>
-              <a:rPr lang="en-US" b="1" cap="all">
+              <a:rPr lang="en-US" b="1" cap="all" dirty="0">
                 <a:solidFill>
                   <a:srgbClr val="FFFFFF"/>
                 </a:solidFill>
               </a:rPr>
               <a:t>RISKY CHANGE</a:t>
             </a:r>
-            <a:endParaRPr lang="en-US">
+            <a:endParaRPr lang="en-US" dirty="0">
               <a:solidFill>
                 <a:srgbClr val="FFFFFF"/>
               </a:solidFill>
@@ -39113,7 +39227,7 @@
           <a:lstStyle/>
           <a:p>
             <a:r>
-              <a:rPr lang="en-US">
+              <a:rPr lang="en-US" dirty="0">
                 <a:solidFill>
                   <a:srgbClr val="FFFFFF"/>
                 </a:solidFill>

</xml_diff>